<commit_message>
Adding in the PPT
</commit_message>
<xml_diff>
--- a/Chart Work.pptx
+++ b/Chart Work.pptx
@@ -5,8 +5,7 @@
     <p:sldMasterId id="2147483648" r:id="rId1"/>
   </p:sldMasterIdLst>
   <p:sldIdLst>
-    <p:sldId id="256" r:id="rId2"/>
-    <p:sldId id="257" r:id="rId3"/>
+    <p:sldId id="258" r:id="rId2"/>
   </p:sldIdLst>
   <p:sldSz cx="12192000" cy="6858000"/>
   <p:notesSz cx="6858000" cy="9144000"/>
@@ -105,6 +104,11 @@
       </a:defRPr>
     </a:lvl9pPr>
   </p:defaultTextStyle>
+  <p:extLst>
+    <p:ext uri="{EFAFB233-063F-42B5-8137-9DF3F51BA10A}">
+      <p15:sldGuideLst xmlns:p15="http://schemas.microsoft.com/office/powerpoint/2012/main"/>
+    </p:ext>
+  </p:extLst>
 </p:presentation>
 </file>
 
@@ -153,7 +157,6 @@
               <a:rPr lang="en-US"/>
               <a:t>Click to edit Master title style</a:t>
             </a:r>
-            <a:endParaRPr lang="en-US"/>
           </a:p>
         </p:txBody>
       </p:sp>
@@ -218,7 +221,6 @@
               <a:rPr lang="en-US"/>
               <a:t>Click to edit Master subtitle style</a:t>
             </a:r>
-            <a:endParaRPr lang="en-US"/>
           </a:p>
         </p:txBody>
       </p:sp>
@@ -239,7 +241,7 @@
           <a:p>
             <a:fld id="{39D93770-FBFE-4759-8265-975FED349D80}" type="datetimeFigureOut">
               <a:rPr lang="en-US" smtClean="0"/>
-              <a:t>3/1/2017</a:t>
+              <a:t>3/2/2017</a:t>
             </a:fld>
             <a:endParaRPr lang="en-US"/>
           </a:p>
@@ -336,7 +338,6 @@
               <a:rPr lang="en-US"/>
               <a:t>Click to edit Master title style</a:t>
             </a:r>
-            <a:endParaRPr lang="en-US"/>
           </a:p>
         </p:txBody>
       </p:sp>
@@ -388,7 +389,6 @@
               <a:rPr lang="en-US"/>
               <a:t>Fifth level</a:t>
             </a:r>
-            <a:endParaRPr lang="en-US"/>
           </a:p>
         </p:txBody>
       </p:sp>
@@ -409,7 +409,7 @@
           <a:p>
             <a:fld id="{39D93770-FBFE-4759-8265-975FED349D80}" type="datetimeFigureOut">
               <a:rPr lang="en-US" smtClean="0"/>
-              <a:t>3/1/2017</a:t>
+              <a:t>3/2/2017</a:t>
             </a:fld>
             <a:endParaRPr lang="en-US"/>
           </a:p>
@@ -511,7 +511,6 @@
               <a:rPr lang="en-US"/>
               <a:t>Click to edit Master title style</a:t>
             </a:r>
-            <a:endParaRPr lang="en-US"/>
           </a:p>
         </p:txBody>
       </p:sp>
@@ -568,7 +567,6 @@
               <a:rPr lang="en-US"/>
               <a:t>Fifth level</a:t>
             </a:r>
-            <a:endParaRPr lang="en-US"/>
           </a:p>
         </p:txBody>
       </p:sp>
@@ -589,7 +587,7 @@
           <a:p>
             <a:fld id="{39D93770-FBFE-4759-8265-975FED349D80}" type="datetimeFigureOut">
               <a:rPr lang="en-US" smtClean="0"/>
-              <a:t>3/1/2017</a:t>
+              <a:t>3/2/2017</a:t>
             </a:fld>
             <a:endParaRPr lang="en-US"/>
           </a:p>
@@ -686,7 +684,6 @@
               <a:rPr lang="en-US"/>
               <a:t>Click to edit Master title style</a:t>
             </a:r>
-            <a:endParaRPr lang="en-US"/>
           </a:p>
         </p:txBody>
       </p:sp>
@@ -738,7 +735,6 @@
               <a:rPr lang="en-US"/>
               <a:t>Fifth level</a:t>
             </a:r>
-            <a:endParaRPr lang="en-US"/>
           </a:p>
         </p:txBody>
       </p:sp>
@@ -759,7 +755,7 @@
           <a:p>
             <a:fld id="{39D93770-FBFE-4759-8265-975FED349D80}" type="datetimeFigureOut">
               <a:rPr lang="en-US" smtClean="0"/>
-              <a:t>3/1/2017</a:t>
+              <a:t>3/2/2017</a:t>
             </a:fld>
             <a:endParaRPr lang="en-US"/>
           </a:p>
@@ -865,7 +861,6 @@
               <a:rPr lang="en-US"/>
               <a:t>Click to edit Master title style</a:t>
             </a:r>
-            <a:endParaRPr lang="en-US"/>
           </a:p>
         </p:txBody>
       </p:sp>
@@ -1005,7 +1000,7 @@
           <a:p>
             <a:fld id="{39D93770-FBFE-4759-8265-975FED349D80}" type="datetimeFigureOut">
               <a:rPr lang="en-US" smtClean="0"/>
-              <a:t>3/1/2017</a:t>
+              <a:t>3/2/2017</a:t>
             </a:fld>
             <a:endParaRPr lang="en-US"/>
           </a:p>
@@ -1102,7 +1097,6 @@
               <a:rPr lang="en-US"/>
               <a:t>Click to edit Master title style</a:t>
             </a:r>
-            <a:endParaRPr lang="en-US"/>
           </a:p>
         </p:txBody>
       </p:sp>
@@ -1159,7 +1153,6 @@
               <a:rPr lang="en-US"/>
               <a:t>Fifth level</a:t>
             </a:r>
-            <a:endParaRPr lang="en-US"/>
           </a:p>
         </p:txBody>
       </p:sp>
@@ -1216,7 +1209,6 @@
               <a:rPr lang="en-US"/>
               <a:t>Fifth level</a:t>
             </a:r>
-            <a:endParaRPr lang="en-US"/>
           </a:p>
         </p:txBody>
       </p:sp>
@@ -1237,7 +1229,7 @@
           <a:p>
             <a:fld id="{39D93770-FBFE-4759-8265-975FED349D80}" type="datetimeFigureOut">
               <a:rPr lang="en-US" smtClean="0"/>
-              <a:t>3/1/2017</a:t>
+              <a:t>3/2/2017</a:t>
             </a:fld>
             <a:endParaRPr lang="en-US"/>
           </a:p>
@@ -1339,7 +1331,6 @@
               <a:rPr lang="en-US"/>
               <a:t>Click to edit Master title style</a:t>
             </a:r>
-            <a:endParaRPr lang="en-US"/>
           </a:p>
         </p:txBody>
       </p:sp>
@@ -1461,7 +1452,6 @@
               <a:rPr lang="en-US"/>
               <a:t>Fifth level</a:t>
             </a:r>
-            <a:endParaRPr lang="en-US"/>
           </a:p>
         </p:txBody>
       </p:sp>
@@ -1583,7 +1573,6 @@
               <a:rPr lang="en-US"/>
               <a:t>Fifth level</a:t>
             </a:r>
-            <a:endParaRPr lang="en-US"/>
           </a:p>
         </p:txBody>
       </p:sp>
@@ -1604,7 +1593,7 @@
           <a:p>
             <a:fld id="{39D93770-FBFE-4759-8265-975FED349D80}" type="datetimeFigureOut">
               <a:rPr lang="en-US" smtClean="0"/>
-              <a:t>3/1/2017</a:t>
+              <a:t>3/2/2017</a:t>
             </a:fld>
             <a:endParaRPr lang="en-US"/>
           </a:p>
@@ -1701,7 +1690,6 @@
               <a:rPr lang="en-US"/>
               <a:t>Click to edit Master title style</a:t>
             </a:r>
-            <a:endParaRPr lang="en-US"/>
           </a:p>
         </p:txBody>
       </p:sp>
@@ -1722,7 +1710,7 @@
           <a:p>
             <a:fld id="{39D93770-FBFE-4759-8265-975FED349D80}" type="datetimeFigureOut">
               <a:rPr lang="en-US" smtClean="0"/>
-              <a:t>3/1/2017</a:t>
+              <a:t>3/2/2017</a:t>
             </a:fld>
             <a:endParaRPr lang="en-US"/>
           </a:p>
@@ -1817,7 +1805,7 @@
           <a:p>
             <a:fld id="{39D93770-FBFE-4759-8265-975FED349D80}" type="datetimeFigureOut">
               <a:rPr lang="en-US" smtClean="0"/>
-              <a:t>3/1/2017</a:t>
+              <a:t>3/2/2017</a:t>
             </a:fld>
             <a:endParaRPr lang="en-US"/>
           </a:p>
@@ -1923,7 +1911,6 @@
               <a:rPr lang="en-US"/>
               <a:t>Click to edit Master title style</a:t>
             </a:r>
-            <a:endParaRPr lang="en-US"/>
           </a:p>
         </p:txBody>
       </p:sp>
@@ -2008,7 +1995,6 @@
               <a:rPr lang="en-US"/>
               <a:t>Fifth level</a:t>
             </a:r>
-            <a:endParaRPr lang="en-US"/>
           </a:p>
         </p:txBody>
       </p:sp>
@@ -2094,7 +2080,7 @@
           <a:p>
             <a:fld id="{39D93770-FBFE-4759-8265-975FED349D80}" type="datetimeFigureOut">
               <a:rPr lang="en-US" smtClean="0"/>
-              <a:t>3/1/2017</a:t>
+              <a:t>3/2/2017</a:t>
             </a:fld>
             <a:endParaRPr lang="en-US"/>
           </a:p>
@@ -2200,7 +2186,6 @@
               <a:rPr lang="en-US"/>
               <a:t>Click to edit Master title style</a:t>
             </a:r>
-            <a:endParaRPr lang="en-US"/>
           </a:p>
         </p:txBody>
       </p:sp>
@@ -2347,7 +2332,7 @@
           <a:p>
             <a:fld id="{39D93770-FBFE-4759-8265-975FED349D80}" type="datetimeFigureOut">
               <a:rPr lang="en-US" smtClean="0"/>
-              <a:t>3/1/2017</a:t>
+              <a:t>3/2/2017</a:t>
             </a:fld>
             <a:endParaRPr lang="en-US"/>
           </a:p>
@@ -2459,7 +2444,6 @@
               <a:rPr lang="en-US"/>
               <a:t>Click to edit Master title style</a:t>
             </a:r>
-            <a:endParaRPr lang="en-US"/>
           </a:p>
         </p:txBody>
       </p:sp>
@@ -2521,7 +2505,6 @@
               <a:rPr lang="en-US"/>
               <a:t>Fifth level</a:t>
             </a:r>
-            <a:endParaRPr lang="en-US"/>
           </a:p>
         </p:txBody>
       </p:sp>
@@ -2560,7 +2543,7 @@
           <a:p>
             <a:fld id="{39D93770-FBFE-4759-8265-975FED349D80}" type="datetimeFigureOut">
               <a:rPr lang="en-US" smtClean="0"/>
-              <a:t>3/1/2017</a:t>
+              <a:t>3/2/2017</a:t>
             </a:fld>
             <a:endParaRPr lang="en-US"/>
           </a:p>
@@ -2967,139 +2950,6 @@
       </p:grpSpPr>
       <p:sp>
         <p:nvSpPr>
-          <p:cNvPr id="2" name="Title 1"/>
-          <p:cNvSpPr>
-            <a:spLocks noGrp="1"/>
-          </p:cNvSpPr>
-          <p:nvPr>
-            <p:ph type="ctrTitle"/>
-          </p:nvPr>
-        </p:nvSpPr>
-        <p:spPr/>
-        <p:txBody>
-          <a:bodyPr/>
-          <a:lstStyle/>
-          <a:p>
-            <a:endParaRPr lang="en-US"/>
-          </a:p>
-        </p:txBody>
-      </p:sp>
-      <p:sp>
-        <p:nvSpPr>
-          <p:cNvPr id="3" name="Subtitle 2"/>
-          <p:cNvSpPr>
-            <a:spLocks noGrp="1"/>
-          </p:cNvSpPr>
-          <p:nvPr>
-            <p:ph type="subTitle" idx="1"/>
-          </p:nvPr>
-        </p:nvSpPr>
-        <p:spPr/>
-        <p:txBody>
-          <a:bodyPr/>
-          <a:lstStyle/>
-          <a:p>
-            <a:endParaRPr lang="en-US"/>
-          </a:p>
-        </p:txBody>
-      </p:sp>
-    </p:spTree>
-    <p:extLst>
-      <p:ext uri="{BB962C8B-B14F-4D97-AF65-F5344CB8AC3E}">
-        <p14:creationId xmlns:p14="http://schemas.microsoft.com/office/powerpoint/2010/main" val="2016051985"/>
-      </p:ext>
-    </p:extLst>
-  </p:cSld>
-  <p:clrMapOvr>
-    <a:masterClrMapping/>
-  </p:clrMapOvr>
-</p:sld>
-</file>
-
-<file path=ppt/slides/slide2.xml><?xml version="1.0" encoding="utf-8"?>
-<p:sld xmlns:a="http://schemas.openxmlformats.org/drawingml/2006/main" xmlns:r="http://schemas.openxmlformats.org/officeDocument/2006/relationships" xmlns:p="http://schemas.openxmlformats.org/presentationml/2006/main">
-  <p:cSld>
-    <p:spTree>
-      <p:nvGrpSpPr>
-        <p:cNvPr id="1" name=""/>
-        <p:cNvGrpSpPr/>
-        <p:nvPr/>
-      </p:nvGrpSpPr>
-      <p:grpSpPr>
-        <a:xfrm>
-          <a:off x="0" y="0"/>
-          <a:ext cx="0" cy="0"/>
-          <a:chOff x="0" y="0"/>
-          <a:chExt cx="0" cy="0"/>
-        </a:xfrm>
-      </p:grpSpPr>
-      <p:pic>
-        <p:nvPicPr>
-          <p:cNvPr id="13" name="Picture 12"/>
-          <p:cNvPicPr>
-            <a:picLocks noChangeAspect="1"/>
-          </p:cNvPicPr>
-          <p:nvPr/>
-        </p:nvPicPr>
-        <p:blipFill rotWithShape="1">
-          <a:blip r:embed="rId2"/>
-          <a:srcRect l="7425" t="4222"/>
-          <a:stretch/>
-        </p:blipFill>
-        <p:spPr>
-          <a:xfrm>
-            <a:off x="1708857" y="1478071"/>
-            <a:ext cx="9282122" cy="4806748"/>
-          </a:xfrm>
-          <a:prstGeom prst="rect">
-            <a:avLst/>
-          </a:prstGeom>
-        </p:spPr>
-      </p:pic>
-      <p:sp>
-        <p:nvSpPr>
-          <p:cNvPr id="6" name="TextBox 5"/>
-          <p:cNvSpPr txBox="1"/>
-          <p:nvPr/>
-        </p:nvSpPr>
-        <p:spPr>
-          <a:xfrm>
-            <a:off x="10731785" y="3881445"/>
-            <a:ext cx="2707008" cy="523220"/>
-          </a:xfrm>
-          <a:prstGeom prst="rect">
-            <a:avLst/>
-          </a:prstGeom>
-          <a:noFill/>
-        </p:spPr>
-        <p:txBody>
-          <a:bodyPr wrap="square" rtlCol="0">
-            <a:spAutoFit/>
-          </a:bodyPr>
-          <a:lstStyle/>
-          <a:p>
-            <a:r>
-              <a:rPr lang="en-US" sz="2800" b="1" dirty="0">
-                <a:solidFill>
-                  <a:schemeClr val="accent1">
-                    <a:lumMod val="75000"/>
-                  </a:schemeClr>
-                </a:solidFill>
-              </a:rPr>
-              <a:t>Ohio</a:t>
-            </a:r>
-            <a:endParaRPr lang="en-US" sz="2800" dirty="0">
-              <a:solidFill>
-                <a:schemeClr val="accent1">
-                  <a:lumMod val="75000"/>
-                </a:schemeClr>
-              </a:solidFill>
-            </a:endParaRPr>
-          </a:p>
-        </p:txBody>
-      </p:sp>
-      <p:sp>
-        <p:nvSpPr>
           <p:cNvPr id="7" name="TextBox 6"/>
           <p:cNvSpPr txBox="1"/>
           <p:nvPr/>
@@ -3136,7 +2986,7 @@
           <p:nvPr/>
         </p:nvPicPr>
         <p:blipFill>
-          <a:blip r:embed="rId3"/>
+          <a:blip r:embed="rId2"/>
           <a:stretch>
             <a:fillRect/>
           </a:stretch>
@@ -3159,7 +3009,7 @@
         </p:nvSpPr>
         <p:spPr>
           <a:xfrm>
-            <a:off x="703855" y="1358370"/>
+            <a:off x="678802" y="1198916"/>
             <a:ext cx="800219" cy="4843865"/>
           </a:xfrm>
           <a:prstGeom prst="rect">
@@ -3187,6 +3037,30 @@
           </a:p>
         </p:txBody>
       </p:sp>
+      <p:pic>
+        <p:nvPicPr>
+          <p:cNvPr id="2" name="Picture 1"/>
+          <p:cNvPicPr>
+            <a:picLocks noChangeAspect="1"/>
+          </p:cNvPicPr>
+          <p:nvPr/>
+        </p:nvPicPr>
+        <p:blipFill>
+          <a:blip r:embed="rId3"/>
+          <a:stretch>
+            <a:fillRect/>
+          </a:stretch>
+        </p:blipFill>
+        <p:spPr>
+          <a:xfrm>
+            <a:off x="1708856" y="1198916"/>
+            <a:ext cx="6401435" cy="5414226"/>
+          </a:xfrm>
+          <a:prstGeom prst="rect">
+            <a:avLst/>
+          </a:prstGeom>
+        </p:spPr>
+      </p:pic>
       <p:sp>
         <p:nvSpPr>
           <p:cNvPr id="12" name="TextBox 11"/>
@@ -3196,7 +3070,7 @@
         <p:spPr>
           <a:xfrm>
             <a:off x="678803" y="491030"/>
-            <a:ext cx="10870194" cy="830997"/>
+            <a:ext cx="8658237" cy="707886"/>
           </a:xfrm>
           <a:prstGeom prst="rect">
             <a:avLst/>
@@ -3210,14 +3084,134 @@
           <a:lstStyle/>
           <a:p>
             <a:r>
-              <a:rPr lang="en-US" sz="2400" dirty="0">
+              <a:rPr lang="en-US" sz="2000" dirty="0">
                 <a:solidFill>
                   <a:schemeClr val="bg1">
                     <a:lumMod val="50000"/>
                   </a:schemeClr>
                 </a:solidFill>
               </a:rPr>
-              <a:t>Ohio has kept pace with the other states but remains among the top 10 states with the highest rates.</a:t>
+              <a:t>When adjusting for age of the patient, Ohio has kept pace with the other states but consistently ranked among the top 15 states with the highest rates.</a:t>
+            </a:r>
+          </a:p>
+        </p:txBody>
+      </p:sp>
+      <p:sp>
+        <p:nvSpPr>
+          <p:cNvPr id="3" name="TextBox 2"/>
+          <p:cNvSpPr txBox="1"/>
+          <p:nvPr/>
+        </p:nvSpPr>
+        <p:spPr>
+          <a:xfrm>
+            <a:off x="2902973" y="6519446"/>
+            <a:ext cx="8442960" cy="338554"/>
+          </a:xfrm>
+          <a:prstGeom prst="rect">
+            <a:avLst/>
+          </a:prstGeom>
+          <a:noFill/>
+        </p:spPr>
+        <p:txBody>
+          <a:bodyPr wrap="square" rtlCol="0">
+            <a:spAutoFit/>
+          </a:bodyPr>
+          <a:lstStyle/>
+          <a:p>
+            <a:r>
+              <a:rPr lang="en-US" sz="1600" dirty="0">
+                <a:solidFill>
+                  <a:schemeClr val="bg1">
+                    <a:lumMod val="65000"/>
+                  </a:schemeClr>
+                </a:solidFill>
+              </a:rPr>
+              <a:t>Data Source: CDC Wonder Search Performed March 1</a:t>
+            </a:r>
+            <a:r>
+              <a:rPr lang="en-US" sz="1600" baseline="30000" dirty="0">
+                <a:solidFill>
+                  <a:schemeClr val="bg1">
+                    <a:lumMod val="65000"/>
+                  </a:schemeClr>
+                </a:solidFill>
+              </a:rPr>
+              <a:t>st</a:t>
+            </a:r>
+            <a:r>
+              <a:rPr lang="en-US" sz="1600" dirty="0">
+                <a:solidFill>
+                  <a:schemeClr val="bg1">
+                    <a:lumMod val="65000"/>
+                  </a:schemeClr>
+                </a:solidFill>
+              </a:rPr>
+              <a:t>, 2017 </a:t>
+            </a:r>
+          </a:p>
+        </p:txBody>
+      </p:sp>
+      <p:sp>
+        <p:nvSpPr>
+          <p:cNvPr id="6" name="TextBox 5"/>
+          <p:cNvSpPr txBox="1"/>
+          <p:nvPr/>
+        </p:nvSpPr>
+        <p:spPr>
+          <a:xfrm>
+            <a:off x="7785171" y="4161220"/>
+            <a:ext cx="1704269" cy="1020380"/>
+          </a:xfrm>
+          <a:prstGeom prst="rect">
+            <a:avLst/>
+          </a:prstGeom>
+          <a:noFill/>
+        </p:spPr>
+        <p:txBody>
+          <a:bodyPr wrap="square" rtlCol="0">
+            <a:spAutoFit/>
+          </a:bodyPr>
+          <a:lstStyle/>
+          <a:p>
+            <a:r>
+              <a:rPr lang="en-US" sz="2000" b="1" dirty="0">
+                <a:solidFill>
+                  <a:schemeClr val="accent1">
+                    <a:lumMod val="75000"/>
+                  </a:schemeClr>
+                </a:solidFill>
+              </a:rPr>
+              <a:t>Ohio</a:t>
+            </a:r>
+            <a:r>
+              <a:rPr lang="en-US" sz="2000" dirty="0">
+                <a:solidFill>
+                  <a:schemeClr val="accent1">
+                    <a:lumMod val="75000"/>
+                  </a:schemeClr>
+                </a:solidFill>
+              </a:rPr>
+              <a:t> had the 11</a:t>
+            </a:r>
+            <a:r>
+              <a:rPr lang="en-US" sz="2000" baseline="30000" dirty="0">
+                <a:solidFill>
+                  <a:schemeClr val="accent1">
+                    <a:lumMod val="75000"/>
+                  </a:schemeClr>
+                </a:solidFill>
+              </a:rPr>
+              <a:t>th</a:t>
+            </a:r>
+            <a:r>
+              <a:rPr lang="en-US" sz="2000" dirty="0">
+                <a:solidFill>
+                  <a:schemeClr val="accent1">
+                    <a:lumMod val="75000"/>
+                  </a:schemeClr>
+                </a:solidFill>
+              </a:rPr>
+              <a:t> highest rate in 2015.</a:t>
             </a:r>
           </a:p>
         </p:txBody>
@@ -3225,7 +3219,7 @@
     </p:spTree>
     <p:extLst>
       <p:ext uri="{BB962C8B-B14F-4D97-AF65-F5344CB8AC3E}">
-        <p14:creationId xmlns:p14="http://schemas.microsoft.com/office/powerpoint/2010/main" val="1160493563"/>
+        <p14:creationId xmlns:p14="http://schemas.microsoft.com/office/powerpoint/2010/main" val="712153001"/>
       </p:ext>
     </p:extLst>
   </p:cSld>

</xml_diff>